<commit_message>
update presentasi wagub 2
</commit_message>
<xml_diff>
--- a/Analisis Pendahuluan PKL Tanah Abang.pptx
+++ b/Analisis Pendahuluan PKL Tanah Abang.pptx
@@ -111,7 +111,7 @@
   </p:defaultTextStyle>
   <p:extLst>
     <p:ext uri="{521415D9-36F7-43E2-AB2F-B90AF26B5E84}">
-      <p14:sectionLst xmlns:p14="http://schemas.microsoft.com/office/powerpoint/2010/main" xmlns="">
+      <p14:sectionLst xmlns="" xmlns:p14="http://schemas.microsoft.com/office/powerpoint/2010/main">
         <p14:section name="Default Section" id="{A2EC3207-5504-452C-86C4-0360466218F3}">
           <p14:sldIdLst>
             <p14:sldId id="262"/>
@@ -127,7 +127,7 @@
       </p14:sectionLst>
     </p:ext>
     <p:ext uri="{EFAFB233-063F-42B5-8137-9DF3F51BA10A}">
-      <p15:sldGuideLst xmlns:p15="http://schemas.microsoft.com/office/powerpoint/2012/main" xmlns=""/>
+      <p15:sldGuideLst xmlns="" xmlns:p15="http://schemas.microsoft.com/office/powerpoint/2012/main"/>
     </p:ext>
   </p:extLst>
 </p:presentation>
@@ -138,7 +138,7 @@
   <p:cmAuthor id="1" name="Data 1" initials="D1" lastIdx="1" clrIdx="0">
     <p:extLst>
       <p:ext uri="{19B8F6BF-5375-455C-9EA6-DF929625EA0E}">
-        <p15:presenceInfo xmlns:p15="http://schemas.microsoft.com/office/powerpoint/2012/main" xmlns="" userId="Data 1" providerId="None"/>
+        <p15:presenceInfo xmlns="" xmlns:p15="http://schemas.microsoft.com/office/powerpoint/2012/main" userId="Data 1" providerId="None"/>
       </p:ext>
     </p:extLst>
   </p:cmAuthor>
@@ -178,7 +178,7 @@
           <a:blip r:embed="rId2" cstate="email">
             <a:extLst>
               <a:ext uri="{28A0092B-C50C-407E-A947-70E740481C1C}">
-                <a14:useLocalDpi xmlns:a14="http://schemas.microsoft.com/office/drawing/2010/main" xmlns=""/>
+                <a14:useLocalDpi xmlns="" xmlns:a14="http://schemas.microsoft.com/office/drawing/2010/main"/>
               </a:ext>
             </a:extLst>
           </a:blip>
@@ -523,7 +523,7 @@
     </p:spTree>
     <p:extLst>
       <p:ext uri="{BB962C8B-B14F-4D97-AF65-F5344CB8AC3E}">
-        <p14:creationId xmlns:p14="http://schemas.microsoft.com/office/powerpoint/2010/main" xmlns="" val="1968009058"/>
+        <p14:creationId xmlns="" xmlns:p14="http://schemas.microsoft.com/office/powerpoint/2010/main" val="1968009058"/>
       </p:ext>
     </p:extLst>
   </p:cSld>
@@ -562,7 +562,7 @@
           <a:blip r:embed="rId2" cstate="email">
             <a:extLst>
               <a:ext uri="{28A0092B-C50C-407E-A947-70E740481C1C}">
-                <a14:useLocalDpi xmlns:a14="http://schemas.microsoft.com/office/drawing/2010/main" xmlns=""/>
+                <a14:useLocalDpi xmlns="" xmlns:a14="http://schemas.microsoft.com/office/drawing/2010/main"/>
               </a:ext>
             </a:extLst>
           </a:blip>
@@ -583,7 +583,7 @@
     </p:spTree>
     <p:extLst>
       <p:ext uri="{BB962C8B-B14F-4D97-AF65-F5344CB8AC3E}">
-        <p14:creationId xmlns:p14="http://schemas.microsoft.com/office/powerpoint/2010/main" xmlns="" val="263930131"/>
+        <p14:creationId xmlns="" xmlns:p14="http://schemas.microsoft.com/office/powerpoint/2010/main" val="263930131"/>
       </p:ext>
     </p:extLst>
   </p:cSld>
@@ -622,7 +622,7 @@
           <a:blip r:embed="rId2" cstate="email">
             <a:extLst>
               <a:ext uri="{28A0092B-C50C-407E-A947-70E740481C1C}">
-                <a14:useLocalDpi xmlns:a14="http://schemas.microsoft.com/office/drawing/2010/main" xmlns=""/>
+                <a14:useLocalDpi xmlns="" xmlns:a14="http://schemas.microsoft.com/office/drawing/2010/main"/>
               </a:ext>
             </a:extLst>
           </a:blip>
@@ -643,7 +643,7 @@
     </p:spTree>
     <p:extLst>
       <p:ext uri="{BB962C8B-B14F-4D97-AF65-F5344CB8AC3E}">
-        <p14:creationId xmlns:p14="http://schemas.microsoft.com/office/powerpoint/2010/main" xmlns="" val="3719468208"/>
+        <p14:creationId xmlns="" xmlns:p14="http://schemas.microsoft.com/office/powerpoint/2010/main" val="3719468208"/>
       </p:ext>
     </p:extLst>
   </p:cSld>
@@ -682,7 +682,7 @@
           <a:blip r:embed="rId2" cstate="email">
             <a:extLst>
               <a:ext uri="{28A0092B-C50C-407E-A947-70E740481C1C}">
-                <a14:useLocalDpi xmlns:a14="http://schemas.microsoft.com/office/drawing/2010/main" xmlns=""/>
+                <a14:useLocalDpi xmlns="" xmlns:a14="http://schemas.microsoft.com/office/drawing/2010/main"/>
               </a:ext>
             </a:extLst>
           </a:blip>
@@ -899,7 +899,7 @@
     </p:spTree>
     <p:extLst>
       <p:ext uri="{BB962C8B-B14F-4D97-AF65-F5344CB8AC3E}">
-        <p14:creationId xmlns:p14="http://schemas.microsoft.com/office/powerpoint/2010/main" xmlns="" val="2049627226"/>
+        <p14:creationId xmlns="" xmlns:p14="http://schemas.microsoft.com/office/powerpoint/2010/main" val="2049627226"/>
       </p:ext>
     </p:extLst>
   </p:cSld>
@@ -1089,7 +1089,7 @@
     </p:spTree>
     <p:extLst>
       <p:ext uri="{BB962C8B-B14F-4D97-AF65-F5344CB8AC3E}">
-        <p14:creationId xmlns:p14="http://schemas.microsoft.com/office/powerpoint/2010/main" xmlns="" val="3069950828"/>
+        <p14:creationId xmlns="" xmlns:p14="http://schemas.microsoft.com/office/powerpoint/2010/main" val="3069950828"/>
       </p:ext>
     </p:extLst>
   </p:cSld>
@@ -1128,7 +1128,7 @@
           <a:blip r:embed="rId2" cstate="email">
             <a:extLst>
               <a:ext uri="{28A0092B-C50C-407E-A947-70E740481C1C}">
-                <a14:useLocalDpi xmlns:a14="http://schemas.microsoft.com/office/drawing/2010/main" xmlns=""/>
+                <a14:useLocalDpi xmlns="" xmlns:a14="http://schemas.microsoft.com/office/drawing/2010/main"/>
               </a:ext>
             </a:extLst>
           </a:blip>
@@ -1158,7 +1158,7 @@
           <a:blip r:embed="rId3" cstate="email">
             <a:extLst>
               <a:ext uri="{28A0092B-C50C-407E-A947-70E740481C1C}">
-                <a14:useLocalDpi xmlns:a14="http://schemas.microsoft.com/office/drawing/2010/main" xmlns=""/>
+                <a14:useLocalDpi xmlns="" xmlns:a14="http://schemas.microsoft.com/office/drawing/2010/main"/>
               </a:ext>
             </a:extLst>
           </a:blip>
@@ -1342,7 +1342,7 @@
     </p:spTree>
     <p:extLst>
       <p:ext uri="{BB962C8B-B14F-4D97-AF65-F5344CB8AC3E}">
-        <p14:creationId xmlns:p14="http://schemas.microsoft.com/office/powerpoint/2010/main" xmlns="" val="1762842516"/>
+        <p14:creationId xmlns="" xmlns:p14="http://schemas.microsoft.com/office/powerpoint/2010/main" val="1762842516"/>
       </p:ext>
     </p:extLst>
   </p:cSld>
@@ -1545,7 +1545,7 @@
             <a:fld id="{CA8936BB-9119-4634-84BC-E84BF1D915FE}" type="datetimeFigureOut">
               <a:rPr lang="en-US" smtClean="0"/>
               <a:pPr/>
-              <a:t>10/31/2017</a:t>
+              <a:t>11/1/2017</a:t>
             </a:fld>
             <a:endParaRPr lang="en-US" dirty="0"/>
           </a:p>
@@ -1662,7 +1662,7 @@
     </p:spTree>
     <p:extLst>
       <p:ext uri="{BB962C8B-B14F-4D97-AF65-F5344CB8AC3E}">
-        <p14:creationId xmlns:p14="http://schemas.microsoft.com/office/powerpoint/2010/main" xmlns="" val="3453102556"/>
+        <p14:creationId xmlns="" xmlns:p14="http://schemas.microsoft.com/office/powerpoint/2010/main" val="3453102556"/>
       </p:ext>
     </p:extLst>
   </p:cSld>
@@ -1899,7 +1899,7 @@
             <a:fld id="{CA8936BB-9119-4634-84BC-E84BF1D915FE}" type="datetimeFigureOut">
               <a:rPr lang="en-US" smtClean="0"/>
               <a:pPr/>
-              <a:t>10/31/2017</a:t>
+              <a:t>11/1/2017</a:t>
             </a:fld>
             <a:endParaRPr lang="en-US"/>
           </a:p>
@@ -2006,7 +2006,7 @@
     </p:spTree>
     <p:extLst>
       <p:ext uri="{BB962C8B-B14F-4D97-AF65-F5344CB8AC3E}">
-        <p14:creationId xmlns:p14="http://schemas.microsoft.com/office/powerpoint/2010/main" xmlns="" val="2517282281"/>
+        <p14:creationId xmlns="" xmlns:p14="http://schemas.microsoft.com/office/powerpoint/2010/main" val="2517282281"/>
       </p:ext>
     </p:extLst>
   </p:cSld>
@@ -2045,7 +2045,7 @@
           <a:blip r:embed="rId2" cstate="email">
             <a:extLst>
               <a:ext uri="{28A0092B-C50C-407E-A947-70E740481C1C}">
-                <a14:useLocalDpi xmlns:a14="http://schemas.microsoft.com/office/drawing/2010/main" xmlns=""/>
+                <a14:useLocalDpi xmlns="" xmlns:a14="http://schemas.microsoft.com/office/drawing/2010/main"/>
               </a:ext>
             </a:extLst>
           </a:blip>
@@ -2140,7 +2140,7 @@
     </p:spTree>
     <p:extLst>
       <p:ext uri="{BB962C8B-B14F-4D97-AF65-F5344CB8AC3E}">
-        <p14:creationId xmlns:p14="http://schemas.microsoft.com/office/powerpoint/2010/main" xmlns="" val="3227955906"/>
+        <p14:creationId xmlns="" xmlns:p14="http://schemas.microsoft.com/office/powerpoint/2010/main" val="3227955906"/>
       </p:ext>
     </p:extLst>
   </p:cSld>
@@ -2357,7 +2357,7 @@
             <a:fld id="{CA8936BB-9119-4634-84BC-E84BF1D915FE}" type="datetimeFigureOut">
               <a:rPr lang="en-US" smtClean="0"/>
               <a:pPr/>
-              <a:t>10/31/2017</a:t>
+              <a:t>11/1/2017</a:t>
             </a:fld>
             <a:endParaRPr lang="en-US"/>
           </a:p>
@@ -2474,7 +2474,7 @@
     </p:spTree>
     <p:extLst>
       <p:ext uri="{BB962C8B-B14F-4D97-AF65-F5344CB8AC3E}">
-        <p14:creationId xmlns:p14="http://schemas.microsoft.com/office/powerpoint/2010/main" xmlns="" val="64487476"/>
+        <p14:creationId xmlns="" xmlns:p14="http://schemas.microsoft.com/office/powerpoint/2010/main" val="64487476"/>
       </p:ext>
     </p:extLst>
   </p:cSld>
@@ -2653,7 +2653,7 @@
             <a:fld id="{CA8936BB-9119-4634-84BC-E84BF1D915FE}" type="datetimeFigureOut">
               <a:rPr lang="en-US" smtClean="0"/>
               <a:pPr/>
-              <a:t>10/31/2017</a:t>
+              <a:t>11/1/2017</a:t>
             </a:fld>
             <a:endParaRPr lang="en-US"/>
           </a:p>
@@ -2770,7 +2770,7 @@
     </p:spTree>
     <p:extLst>
       <p:ext uri="{BB962C8B-B14F-4D97-AF65-F5344CB8AC3E}">
-        <p14:creationId xmlns:p14="http://schemas.microsoft.com/office/powerpoint/2010/main" xmlns="" val="1837571252"/>
+        <p14:creationId xmlns="" xmlns:p14="http://schemas.microsoft.com/office/powerpoint/2010/main" val="1837571252"/>
       </p:ext>
     </p:extLst>
   </p:cSld>
@@ -2814,7 +2814,7 @@
           <a:blip r:embed="rId13" cstate="email">
             <a:extLst>
               <a:ext uri="{28A0092B-C50C-407E-A947-70E740481C1C}">
-                <a14:useLocalDpi xmlns:a14="http://schemas.microsoft.com/office/drawing/2010/main" xmlns=""/>
+                <a14:useLocalDpi xmlns="" xmlns:a14="http://schemas.microsoft.com/office/drawing/2010/main"/>
               </a:ext>
             </a:extLst>
           </a:blip>
@@ -2909,7 +2909,7 @@
           <a:blip r:embed="rId14" cstate="email">
             <a:extLst>
               <a:ext uri="{28A0092B-C50C-407E-A947-70E740481C1C}">
-                <a14:useLocalDpi xmlns:a14="http://schemas.microsoft.com/office/drawing/2010/main" xmlns=""/>
+                <a14:useLocalDpi xmlns="" xmlns:a14="http://schemas.microsoft.com/office/drawing/2010/main"/>
               </a:ext>
             </a:extLst>
           </a:blip>
@@ -2930,7 +2930,7 @@
     </p:spTree>
     <p:extLst>
       <p:ext uri="{BB962C8B-B14F-4D97-AF65-F5344CB8AC3E}">
-        <p14:creationId xmlns:p14="http://schemas.microsoft.com/office/powerpoint/2010/main" xmlns="" val="1778616413"/>
+        <p14:creationId xmlns="" xmlns:p14="http://schemas.microsoft.com/office/powerpoint/2010/main" val="1778616413"/>
       </p:ext>
     </p:extLst>
   </p:cSld>
@@ -3253,7 +3253,7 @@
           <p:cNvPr id="2" name="Title 1">
             <a:extLst>
               <a:ext uri="{FF2B5EF4-FFF2-40B4-BE49-F238E27FC236}">
-                <a16:creationId xmlns:a16="http://schemas.microsoft.com/office/drawing/2014/main" xmlns="" id="{6EC84F9C-D9B7-4A95-AE28-8595381C2FE4}"/>
+                <a16:creationId xmlns="" xmlns:a16="http://schemas.microsoft.com/office/drawing/2014/main" id="{6EC84F9C-D9B7-4A95-AE28-8595381C2FE4}"/>
               </a:ext>
             </a:extLst>
           </p:cNvPr>
@@ -3352,7 +3352,7 @@
           <p:cNvPr id="5" name="Picture 4">
             <a:extLst>
               <a:ext uri="{FF2B5EF4-FFF2-40B4-BE49-F238E27FC236}">
-                <a16:creationId xmlns:a16="http://schemas.microsoft.com/office/drawing/2014/main" xmlns="" id="{3CE608B1-1C09-483D-9140-7B86E51CDEB7}"/>
+                <a16:creationId xmlns="" xmlns:a16="http://schemas.microsoft.com/office/drawing/2014/main" id="{3CE608B1-1C09-483D-9140-7B86E51CDEB7}"/>
               </a:ext>
             </a:extLst>
           </p:cNvPr>
@@ -3365,7 +3365,7 @@
           <a:blip r:embed="rId2" cstate="email">
             <a:extLst>
               <a:ext uri="{28A0092B-C50C-407E-A947-70E740481C1C}">
-                <a14:useLocalDpi xmlns:a14="http://schemas.microsoft.com/office/drawing/2010/main" xmlns=""/>
+                <a14:useLocalDpi xmlns="" xmlns:a14="http://schemas.microsoft.com/office/drawing/2010/main"/>
               </a:ext>
             </a:extLst>
           </a:blip>
@@ -3386,7 +3386,7 @@
     </p:spTree>
     <p:extLst>
       <p:ext uri="{BB962C8B-B14F-4D97-AF65-F5344CB8AC3E}">
-        <p14:creationId xmlns:p14="http://schemas.microsoft.com/office/powerpoint/2010/main" xmlns="" val="1552268445"/>
+        <p14:creationId xmlns="" xmlns:p14="http://schemas.microsoft.com/office/powerpoint/2010/main" val="1552268445"/>
       </p:ext>
     </p:extLst>
   </p:cSld>
@@ -3425,7 +3425,7 @@
           <p:cNvPr id="6" name="Title 1">
             <a:extLst>
               <a:ext uri="{FF2B5EF4-FFF2-40B4-BE49-F238E27FC236}">
-                <a16:creationId xmlns:a16="http://schemas.microsoft.com/office/drawing/2014/main" xmlns="" id="{9575920D-6349-457B-8283-EDD6930374F6}"/>
+                <a16:creationId xmlns="" xmlns:a16="http://schemas.microsoft.com/office/drawing/2014/main" id="{9575920D-6349-457B-8283-EDD6930374F6}"/>
               </a:ext>
             </a:extLst>
           </p:cNvPr>
@@ -3790,7 +3790,7 @@
     </p:spTree>
     <p:extLst>
       <p:ext uri="{BB962C8B-B14F-4D97-AF65-F5344CB8AC3E}">
-        <p14:creationId xmlns:p14="http://schemas.microsoft.com/office/powerpoint/2010/main" xmlns="" val="3216785082"/>
+        <p14:creationId xmlns="" xmlns:p14="http://schemas.microsoft.com/office/powerpoint/2010/main" val="3216785082"/>
       </p:ext>
     </p:extLst>
   </p:cSld>
@@ -3829,7 +3829,7 @@
           <p:cNvPr id="6" name="Title 1">
             <a:extLst>
               <a:ext uri="{FF2B5EF4-FFF2-40B4-BE49-F238E27FC236}">
-                <a16:creationId xmlns:a16="http://schemas.microsoft.com/office/drawing/2014/main" xmlns="" id="{9575920D-6349-457B-8283-EDD6930374F6}"/>
+                <a16:creationId xmlns="" xmlns:a16="http://schemas.microsoft.com/office/drawing/2014/main" id="{9575920D-6349-457B-8283-EDD6930374F6}"/>
               </a:ext>
             </a:extLst>
           </p:cNvPr>
@@ -4274,7 +4274,7 @@
     </p:spTree>
     <p:extLst>
       <p:ext uri="{BB962C8B-B14F-4D97-AF65-F5344CB8AC3E}">
-        <p14:creationId xmlns:p14="http://schemas.microsoft.com/office/powerpoint/2010/main" xmlns="" val="3216785082"/>
+        <p14:creationId xmlns="" xmlns:p14="http://schemas.microsoft.com/office/powerpoint/2010/main" val="3216785082"/>
       </p:ext>
     </p:extLst>
   </p:cSld>
@@ -4313,7 +4313,7 @@
           <p:cNvPr id="6" name="Title 1">
             <a:extLst>
               <a:ext uri="{FF2B5EF4-FFF2-40B4-BE49-F238E27FC236}">
-                <a16:creationId xmlns:a16="http://schemas.microsoft.com/office/drawing/2014/main" xmlns="" id="{9575920D-6349-457B-8283-EDD6930374F6}"/>
+                <a16:creationId xmlns="" xmlns:a16="http://schemas.microsoft.com/office/drawing/2014/main" id="{9575920D-6349-457B-8283-EDD6930374F6}"/>
               </a:ext>
             </a:extLst>
           </p:cNvPr>
@@ -4792,7 +4792,7 @@
     </p:spTree>
     <p:extLst>
       <p:ext uri="{BB962C8B-B14F-4D97-AF65-F5344CB8AC3E}">
-        <p14:creationId xmlns:p14="http://schemas.microsoft.com/office/powerpoint/2010/main" xmlns="" val="3216785082"/>
+        <p14:creationId xmlns="" xmlns:p14="http://schemas.microsoft.com/office/powerpoint/2010/main" val="3216785082"/>
       </p:ext>
     </p:extLst>
   </p:cSld>
@@ -4831,7 +4831,7 @@
           <p:cNvPr id="6" name="Title 1">
             <a:extLst>
               <a:ext uri="{FF2B5EF4-FFF2-40B4-BE49-F238E27FC236}">
-                <a16:creationId xmlns:a16="http://schemas.microsoft.com/office/drawing/2014/main" xmlns="" id="{9575920D-6349-457B-8283-EDD6930374F6}"/>
+                <a16:creationId xmlns="" xmlns:a16="http://schemas.microsoft.com/office/drawing/2014/main" id="{9575920D-6349-457B-8283-EDD6930374F6}"/>
               </a:ext>
             </a:extLst>
           </p:cNvPr>
@@ -5276,7 +5276,7 @@
     </p:spTree>
     <p:extLst>
       <p:ext uri="{BB962C8B-B14F-4D97-AF65-F5344CB8AC3E}">
-        <p14:creationId xmlns:p14="http://schemas.microsoft.com/office/powerpoint/2010/main" xmlns="" val="3216785082"/>
+        <p14:creationId xmlns="" xmlns:p14="http://schemas.microsoft.com/office/powerpoint/2010/main" val="3216785082"/>
       </p:ext>
     </p:extLst>
   </p:cSld>
@@ -5313,7 +5313,7 @@
     </p:spTree>
     <p:extLst>
       <p:ext uri="{BB962C8B-B14F-4D97-AF65-F5344CB8AC3E}">
-        <p14:creationId xmlns:p14="http://schemas.microsoft.com/office/powerpoint/2010/main" xmlns="" val="1519000729"/>
+        <p14:creationId xmlns="" xmlns:p14="http://schemas.microsoft.com/office/powerpoint/2010/main" val="1519000729"/>
       </p:ext>
     </p:extLst>
   </p:cSld>
@@ -5585,7 +5585,7 @@
   <a:extraClrSchemeLst/>
   <a:extLst>
     <a:ext uri="{05A4C25C-085E-4340-85A3-A5531E510DB2}">
-      <thm15:themeFamily xmlns:thm15="http://schemas.microsoft.com/office/thememl/2012/main" xmlns="" name="Office Theme" id="{62F939B6-93AF-4DB8-9C6B-D6C7DFDC589F}" vid="{4A3C46E8-61CC-4603-A589-7422A47A8E4A}"/>
+      <thm15:themeFamily xmlns="" xmlns:thm15="http://schemas.microsoft.com/office/thememl/2012/main" name="Office Theme" id="{62F939B6-93AF-4DB8-9C6B-D6C7DFDC589F}" vid="{4A3C46E8-61CC-4603-A589-7422A47A8E4A}"/>
     </a:ext>
   </a:extLst>
 </a:theme>

</xml_diff>